<commit_message>
Finished presentations for 101 part 1
</commit_message>
<xml_diff>
--- a/101-A/presentation/markupuk-2020-101-A.pptx
+++ b/101-A/presentation/markupuk-2020-101-A.pptx
@@ -5,10 +5,10 @@
     <p:sldMasterId id="2147483648" r:id="rId1"/>
   </p:sldMasterIdLst>
   <p:notesMasterIdLst>
-    <p:notesMasterId r:id="rId20"/>
+    <p:notesMasterId r:id="rId21"/>
   </p:notesMasterIdLst>
   <p:handoutMasterIdLst>
-    <p:handoutMasterId r:id="rId21"/>
+    <p:handoutMasterId r:id="rId22"/>
   </p:handoutMasterIdLst>
   <p:sldIdLst>
     <p:sldId id="256" r:id="rId2"/>
@@ -28,7 +28,8 @@
     <p:sldId id="335" r:id="rId16"/>
     <p:sldId id="336" r:id="rId17"/>
     <p:sldId id="337" r:id="rId18"/>
-    <p:sldId id="330" r:id="rId19"/>
+    <p:sldId id="338" r:id="rId19"/>
+    <p:sldId id="330" r:id="rId20"/>
   </p:sldIdLst>
   <p:sldSz cx="12192000" cy="6858000"/>
   <p:notesSz cx="6858000" cy="9144000"/>
@@ -232,7 +233,7 @@
           <a:p>
             <a:fld id="{0AAE6376-87C4-4D16-82D1-D37904F930BA}" type="datetimeFigureOut">
               <a:rPr lang="en-NL" smtClean="0"/>
-              <a:t>11/05/2020</a:t>
+              <a:t>25/05/2020</a:t>
             </a:fld>
             <a:endParaRPr lang="en-NL"/>
           </a:p>
@@ -409,7 +410,7 @@
           <a:p>
             <a:fld id="{3FA52A83-AFF0-44B5-B0CB-BF1EF92BF110}" type="datetimeFigureOut">
               <a:rPr lang="en-NL" smtClean="0"/>
-              <a:t>11/05/2020</a:t>
+              <a:t>25/05/2020</a:t>
             </a:fld>
             <a:endParaRPr lang="en-NL"/>
           </a:p>
@@ -1246,7 +1247,7 @@
           <a:p>
             <a:fld id="{9446F294-FC6D-4658-8D72-6C175CC4BEDF}" type="datetimeFigureOut">
               <a:rPr lang="en-US" smtClean="0"/>
-              <a:t>5/11/2020</a:t>
+              <a:t>5/25/2020</a:t>
             </a:fld>
             <a:endParaRPr lang="en-US"/>
           </a:p>
@@ -1446,7 +1447,7 @@
           <a:p>
             <a:fld id="{9446F294-FC6D-4658-8D72-6C175CC4BEDF}" type="datetimeFigureOut">
               <a:rPr lang="en-US" smtClean="0"/>
-              <a:t>5/11/2020</a:t>
+              <a:t>5/25/2020</a:t>
             </a:fld>
             <a:endParaRPr lang="en-US"/>
           </a:p>
@@ -1656,7 +1657,7 @@
           <a:p>
             <a:fld id="{9446F294-FC6D-4658-8D72-6C175CC4BEDF}" type="datetimeFigureOut">
               <a:rPr lang="en-US" smtClean="0"/>
-              <a:t>5/11/2020</a:t>
+              <a:t>5/25/2020</a:t>
             </a:fld>
             <a:endParaRPr lang="en-US"/>
           </a:p>
@@ -1856,7 +1857,7 @@
           <a:p>
             <a:fld id="{9446F294-FC6D-4658-8D72-6C175CC4BEDF}" type="datetimeFigureOut">
               <a:rPr lang="en-US" smtClean="0"/>
-              <a:t>5/11/2020</a:t>
+              <a:t>5/25/2020</a:t>
             </a:fld>
             <a:endParaRPr lang="en-US"/>
           </a:p>
@@ -2132,7 +2133,7 @@
           <a:p>
             <a:fld id="{9446F294-FC6D-4658-8D72-6C175CC4BEDF}" type="datetimeFigureOut">
               <a:rPr lang="en-US" smtClean="0"/>
-              <a:t>5/11/2020</a:t>
+              <a:t>5/25/2020</a:t>
             </a:fld>
             <a:endParaRPr lang="en-US"/>
           </a:p>
@@ -2400,7 +2401,7 @@
           <a:p>
             <a:fld id="{9446F294-FC6D-4658-8D72-6C175CC4BEDF}" type="datetimeFigureOut">
               <a:rPr lang="en-US" smtClean="0"/>
-              <a:t>5/11/2020</a:t>
+              <a:t>5/25/2020</a:t>
             </a:fld>
             <a:endParaRPr lang="en-US"/>
           </a:p>
@@ -2815,7 +2816,7 @@
           <a:p>
             <a:fld id="{9446F294-FC6D-4658-8D72-6C175CC4BEDF}" type="datetimeFigureOut">
               <a:rPr lang="en-US" smtClean="0"/>
-              <a:t>5/11/2020</a:t>
+              <a:t>5/25/2020</a:t>
             </a:fld>
             <a:endParaRPr lang="en-US"/>
           </a:p>
@@ -2957,7 +2958,7 @@
           <a:p>
             <a:fld id="{9446F294-FC6D-4658-8D72-6C175CC4BEDF}" type="datetimeFigureOut">
               <a:rPr lang="en-US" smtClean="0"/>
-              <a:t>5/11/2020</a:t>
+              <a:t>5/25/2020</a:t>
             </a:fld>
             <a:endParaRPr lang="en-US"/>
           </a:p>
@@ -3070,7 +3071,7 @@
           <a:p>
             <a:fld id="{9446F294-FC6D-4658-8D72-6C175CC4BEDF}" type="datetimeFigureOut">
               <a:rPr lang="en-US" smtClean="0"/>
-              <a:t>5/11/2020</a:t>
+              <a:t>5/25/2020</a:t>
             </a:fld>
             <a:endParaRPr lang="en-US"/>
           </a:p>
@@ -3383,7 +3384,7 @@
           <a:p>
             <a:fld id="{9446F294-FC6D-4658-8D72-6C175CC4BEDF}" type="datetimeFigureOut">
               <a:rPr lang="en-US" smtClean="0"/>
-              <a:t>5/11/2020</a:t>
+              <a:t>5/25/2020</a:t>
             </a:fld>
             <a:endParaRPr lang="en-US"/>
           </a:p>
@@ -3672,7 +3673,7 @@
           <a:p>
             <a:fld id="{9446F294-FC6D-4658-8D72-6C175CC4BEDF}" type="datetimeFigureOut">
               <a:rPr lang="en-US" smtClean="0"/>
-              <a:t>5/11/2020</a:t>
+              <a:t>5/25/2020</a:t>
             </a:fld>
             <a:endParaRPr lang="en-US"/>
           </a:p>
@@ -3915,7 +3916,7 @@
           <a:p>
             <a:fld id="{9446F294-FC6D-4658-8D72-6C175CC4BEDF}" type="datetimeFigureOut">
               <a:rPr lang="en-US" smtClean="0"/>
-              <a:t>5/11/2020</a:t>
+              <a:t>5/25/2020</a:t>
             </a:fld>
             <a:endParaRPr lang="en-US"/>
           </a:p>
@@ -6258,7 +6259,7 @@
         </p:nvSpPr>
         <p:spPr>
           <a:xfrm>
-            <a:off x="7753351" y="3924301"/>
+            <a:off x="7896024" y="3723322"/>
             <a:ext cx="4188038" cy="2361354"/>
           </a:xfrm>
           <a:prstGeom prst="wedgeEllipseCallout">
@@ -6291,7 +6292,15 @@
             <a:pPr algn="ctr"/>
             <a:r>
               <a:rPr lang="en-US" sz="2000" dirty="0"/>
-              <a:t>Think of primary ports having little magnets that </a:t>
+              <a:t>Think of primary ports as having little </a:t>
+            </a:r>
+            <a:r>
+              <a:rPr lang="en-US" sz="2000" i="1" dirty="0"/>
+              <a:t>magnets</a:t>
+            </a:r>
+            <a:r>
+              <a:rPr lang="en-US" sz="2000" dirty="0"/>
+              <a:t> that </a:t>
             </a:r>
             <a:r>
               <a:rPr lang="en-US" sz="2000" i="1" dirty="0"/>
@@ -12412,7 +12421,7 @@
           <p:cNvPr id="2" name="Title 1">
             <a:extLst>
               <a:ext uri="{FF2B5EF4-FFF2-40B4-BE49-F238E27FC236}">
-                <a16:creationId xmlns:a16="http://schemas.microsoft.com/office/drawing/2014/main" id="{69C1F8C1-9C4C-4D54-8868-98D27E1594F0}"/>
+                <a16:creationId xmlns:a16="http://schemas.microsoft.com/office/drawing/2014/main" id="{E1A291CF-5B52-4363-8617-5B975E8B14C2}"/>
               </a:ext>
             </a:extLst>
           </p:cNvPr>
@@ -12423,21 +12432,16 @@
             <p:ph type="title"/>
           </p:nvPr>
         </p:nvSpPr>
-        <p:spPr>
-          <a:xfrm>
-            <a:off x="199743" y="148699"/>
-            <a:ext cx="10515600" cy="868503"/>
-          </a:xfrm>
-        </p:spPr>
+        <p:spPr/>
         <p:txBody>
           <a:bodyPr/>
           <a:lstStyle/>
           <a:p>
             <a:r>
-              <a:rPr lang="en-US" b="1" dirty="0"/>
-              <a:t>Goodbye and thank the fish!</a:t>
-            </a:r>
-            <a:endParaRPr lang="en-NL" b="1" dirty="0"/>
+              <a:rPr lang="en-US" dirty="0"/>
+              <a:t>Wrap up:</a:t>
+            </a:r>
+            <a:endParaRPr lang="en-GB" dirty="0"/>
           </a:p>
         </p:txBody>
       </p:sp>
@@ -12446,7 +12450,7 @@
           <p:cNvPr id="3" name="Content Placeholder 2">
             <a:extLst>
               <a:ext uri="{FF2B5EF4-FFF2-40B4-BE49-F238E27FC236}">
-                <a16:creationId xmlns:a16="http://schemas.microsoft.com/office/drawing/2014/main" id="{EB447546-94E1-423A-8164-617B557A77FC}"/>
+                <a16:creationId xmlns:a16="http://schemas.microsoft.com/office/drawing/2014/main" id="{376FB710-45A2-488E-80EE-BFEC0D4BFA7B}"/>
               </a:ext>
             </a:extLst>
           </p:cNvPr>
@@ -12459,8 +12463,8 @@
         </p:nvSpPr>
         <p:spPr>
           <a:xfrm>
-            <a:off x="713755" y="1253331"/>
-            <a:ext cx="10515600" cy="5093362"/>
+            <a:off x="838200" y="1485089"/>
+            <a:ext cx="10515600" cy="4691874"/>
           </a:xfrm>
         </p:spPr>
         <p:txBody>
@@ -12469,6 +12473,327 @@
           </a:bodyPr>
           <a:lstStyle/>
           <a:p>
+            <a:r>
+              <a:rPr lang="en-US" dirty="0"/>
+              <a:t>XProc is a </a:t>
+            </a:r>
+            <a:r>
+              <a:rPr lang="en-US" i="1" dirty="0"/>
+              <a:t>pipeline</a:t>
+            </a:r>
+            <a:r>
+              <a:rPr lang="en-US" dirty="0"/>
+              <a:t> language for documents, it chains </a:t>
+            </a:r>
+            <a:r>
+              <a:rPr lang="en-US" i="1" dirty="0"/>
+              <a:t>steps</a:t>
+            </a:r>
+          </a:p>
+          <a:p>
+            <a:r>
+              <a:rPr lang="en-US" dirty="0"/>
+              <a:t>Documents flow in and out of steps through </a:t>
+            </a:r>
+            <a:r>
+              <a:rPr lang="en-US" i="1" dirty="0"/>
+              <a:t>ports</a:t>
+            </a:r>
+          </a:p>
+          <a:p>
+            <a:r>
+              <a:rPr lang="en-US" dirty="0"/>
+              <a:t>One input and one output port can be </a:t>
+            </a:r>
+            <a:r>
+              <a:rPr lang="en-US" i="1" dirty="0"/>
+              <a:t>primary</a:t>
+            </a:r>
+            <a:r>
+              <a:rPr lang="en-US" dirty="0"/>
+              <a:t>: These ports  automatically connect</a:t>
+            </a:r>
+          </a:p>
+          <a:p>
+            <a:pPr lvl="1"/>
+            <a:r>
+              <a:rPr lang="en-US" dirty="0"/>
+              <a:t>Primary ports are called </a:t>
+            </a:r>
+            <a:r>
+              <a:rPr lang="en-US" sz="2000" dirty="0">
+                <a:latin typeface="Courier New" panose="02070309020205020404" pitchFamily="49" charset="0"/>
+                <a:cs typeface="Courier New" panose="02070309020205020404" pitchFamily="49" charset="0"/>
+              </a:rPr>
+              <a:t>source</a:t>
+            </a:r>
+            <a:r>
+              <a:rPr lang="en-US" dirty="0"/>
+              <a:t> and </a:t>
+            </a:r>
+            <a:r>
+              <a:rPr lang="en-US" sz="2000" dirty="0">
+                <a:latin typeface="Courier New" panose="02070309020205020404" pitchFamily="49" charset="0"/>
+                <a:cs typeface="Courier New" panose="02070309020205020404" pitchFamily="49" charset="0"/>
+              </a:rPr>
+              <a:t>result</a:t>
+            </a:r>
+            <a:r>
+              <a:rPr lang="en-US" dirty="0"/>
+              <a:t> by convention</a:t>
+            </a:r>
+          </a:p>
+          <a:p>
+            <a:r>
+              <a:rPr lang="en-US" dirty="0"/>
+              <a:t>You can connect a port to:</a:t>
+            </a:r>
+          </a:p>
+          <a:p>
+            <a:pPr lvl="1"/>
+            <a:r>
+              <a:rPr lang="en-US" dirty="0"/>
+              <a:t>Another port (either </a:t>
+            </a:r>
+            <a:r>
+              <a:rPr lang="en-US" i="1" dirty="0"/>
+              <a:t>implicit</a:t>
+            </a:r>
+            <a:r>
+              <a:rPr lang="en-US" dirty="0"/>
+              <a:t> for primary ports or </a:t>
+            </a:r>
+            <a:r>
+              <a:rPr lang="en-US" i="1" dirty="0"/>
+              <a:t>explicit</a:t>
+            </a:r>
+            <a:r>
+              <a:rPr lang="en-US" dirty="0"/>
+              <a:t>: </a:t>
+            </a:r>
+            <a:r>
+              <a:rPr lang="en-US" sz="2000" dirty="0">
+                <a:latin typeface="Courier New" panose="02070309020205020404" pitchFamily="49" charset="0"/>
+                <a:cs typeface="Courier New" panose="02070309020205020404" pitchFamily="49" charset="0"/>
+              </a:rPr>
+              <a:t>&lt;</a:t>
+            </a:r>
+            <a:r>
+              <a:rPr lang="en-US" sz="2000" dirty="0" err="1">
+                <a:latin typeface="Courier New" panose="02070309020205020404" pitchFamily="49" charset="0"/>
+                <a:cs typeface="Courier New" panose="02070309020205020404" pitchFamily="49" charset="0"/>
+              </a:rPr>
+              <a:t>p:pipe</a:t>
+            </a:r>
+            <a:r>
+              <a:rPr lang="en-US" sz="2000" dirty="0">
+                <a:latin typeface="Courier New" panose="02070309020205020404" pitchFamily="49" charset="0"/>
+                <a:cs typeface="Courier New" panose="02070309020205020404" pitchFamily="49" charset="0"/>
+              </a:rPr>
+              <a:t>&gt;</a:t>
+            </a:r>
+            <a:r>
+              <a:rPr lang="en-US" dirty="0"/>
+              <a:t> or </a:t>
+            </a:r>
+            <a:r>
+              <a:rPr lang="en-US" sz="2000" dirty="0">
+                <a:latin typeface="Courier New" panose="02070309020205020404" pitchFamily="49" charset="0"/>
+                <a:cs typeface="Courier New" panose="02070309020205020404" pitchFamily="49" charset="0"/>
+              </a:rPr>
+              <a:t>@pipe</a:t>
+            </a:r>
+            <a:r>
+              <a:rPr lang="en-US" dirty="0"/>
+              <a:t>)</a:t>
+            </a:r>
+          </a:p>
+          <a:p>
+            <a:pPr lvl="1"/>
+            <a:r>
+              <a:rPr lang="en-US" dirty="0"/>
+              <a:t>To a document stated inline (</a:t>
+            </a:r>
+            <a:r>
+              <a:rPr lang="en-US" sz="2000" dirty="0">
+                <a:latin typeface="Courier New" panose="02070309020205020404" pitchFamily="49" charset="0"/>
+                <a:cs typeface="Courier New" panose="02070309020205020404" pitchFamily="49" charset="0"/>
+              </a:rPr>
+              <a:t>&lt;</a:t>
+            </a:r>
+            <a:r>
+              <a:rPr lang="en-US" sz="2000" dirty="0" err="1">
+                <a:latin typeface="Courier New" panose="02070309020205020404" pitchFamily="49" charset="0"/>
+                <a:cs typeface="Courier New" panose="02070309020205020404" pitchFamily="49" charset="0"/>
+              </a:rPr>
+              <a:t>p:inline</a:t>
+            </a:r>
+            <a:r>
+              <a:rPr lang="en-US" sz="2000" dirty="0">
+                <a:latin typeface="Courier New" panose="02070309020205020404" pitchFamily="49" charset="0"/>
+                <a:cs typeface="Courier New" panose="02070309020205020404" pitchFamily="49" charset="0"/>
+              </a:rPr>
+              <a:t>&gt;</a:t>
+            </a:r>
+            <a:r>
+              <a:rPr lang="en-US" dirty="0"/>
+              <a:t>)</a:t>
+            </a:r>
+          </a:p>
+          <a:p>
+            <a:pPr lvl="1"/>
+            <a:r>
+              <a:rPr lang="en-US" dirty="0"/>
+              <a:t>To a document on disk (</a:t>
+            </a:r>
+            <a:r>
+              <a:rPr lang="en-US" sz="2000" dirty="0">
+                <a:latin typeface="Courier New" panose="02070309020205020404" pitchFamily="49" charset="0"/>
+                <a:cs typeface="Courier New" panose="02070309020205020404" pitchFamily="49" charset="0"/>
+              </a:rPr>
+              <a:t>&lt;</a:t>
+            </a:r>
+            <a:r>
+              <a:rPr lang="en-US" sz="2000" dirty="0" err="1">
+                <a:latin typeface="Courier New" panose="02070309020205020404" pitchFamily="49" charset="0"/>
+                <a:cs typeface="Courier New" panose="02070309020205020404" pitchFamily="49" charset="0"/>
+              </a:rPr>
+              <a:t>p:document</a:t>
+            </a:r>
+            <a:r>
+              <a:rPr lang="en-US" sz="2000" dirty="0">
+                <a:latin typeface="Courier New" panose="02070309020205020404" pitchFamily="49" charset="0"/>
+                <a:cs typeface="Courier New" panose="02070309020205020404" pitchFamily="49" charset="0"/>
+              </a:rPr>
+              <a:t>&gt;</a:t>
+            </a:r>
+            <a:r>
+              <a:rPr lang="en-US" dirty="0"/>
+              <a:t> or </a:t>
+            </a:r>
+            <a:r>
+              <a:rPr lang="en-US" sz="2000" dirty="0">
+                <a:latin typeface="Courier New" panose="02070309020205020404" pitchFamily="49" charset="0"/>
+                <a:cs typeface="Courier New" panose="02070309020205020404" pitchFamily="49" charset="0"/>
+              </a:rPr>
+              <a:t>@</a:t>
+            </a:r>
+            <a:r>
+              <a:rPr lang="en-US" sz="2000" dirty="0" err="1">
+                <a:latin typeface="Courier New" panose="02070309020205020404" pitchFamily="49" charset="0"/>
+                <a:cs typeface="Courier New" panose="02070309020205020404" pitchFamily="49" charset="0"/>
+              </a:rPr>
+              <a:t>href</a:t>
+            </a:r>
+            <a:r>
+              <a:rPr lang="en-US" dirty="0"/>
+              <a:t>)</a:t>
+            </a:r>
+          </a:p>
+          <a:p>
+            <a:r>
+              <a:rPr lang="en-GB" i="1" dirty="0"/>
+              <a:t>Options</a:t>
+            </a:r>
+            <a:r>
+              <a:rPr lang="en-GB" dirty="0"/>
+              <a:t> are additional switches for the steps and/or your pipelines</a:t>
+            </a:r>
+          </a:p>
+        </p:txBody>
+      </p:sp>
+    </p:spTree>
+    <p:extLst>
+      <p:ext uri="{BB962C8B-B14F-4D97-AF65-F5344CB8AC3E}">
+        <p14:creationId xmlns:p14="http://schemas.microsoft.com/office/powerpoint/2010/main" val="2318689730"/>
+      </p:ext>
+    </p:extLst>
+  </p:cSld>
+  <p:clrMapOvr>
+    <a:masterClrMapping/>
+  </p:clrMapOvr>
+</p:sld>
+</file>
+
+<file path=ppt/slides/slide19.xml><?xml version="1.0" encoding="utf-8"?>
+<p:sld xmlns:a="http://schemas.openxmlformats.org/drawingml/2006/main" xmlns:r="http://schemas.openxmlformats.org/officeDocument/2006/relationships" xmlns:p="http://schemas.openxmlformats.org/presentationml/2006/main">
+  <p:cSld>
+    <p:spTree>
+      <p:nvGrpSpPr>
+        <p:cNvPr id="1" name=""/>
+        <p:cNvGrpSpPr/>
+        <p:nvPr/>
+      </p:nvGrpSpPr>
+      <p:grpSpPr>
+        <a:xfrm>
+          <a:off x="0" y="0"/>
+          <a:ext cx="0" cy="0"/>
+          <a:chOff x="0" y="0"/>
+          <a:chExt cx="0" cy="0"/>
+        </a:xfrm>
+      </p:grpSpPr>
+      <p:sp>
+        <p:nvSpPr>
+          <p:cNvPr id="2" name="Title 1">
+            <a:extLst>
+              <a:ext uri="{FF2B5EF4-FFF2-40B4-BE49-F238E27FC236}">
+                <a16:creationId xmlns:a16="http://schemas.microsoft.com/office/drawing/2014/main" id="{69C1F8C1-9C4C-4D54-8868-98D27E1594F0}"/>
+              </a:ext>
+            </a:extLst>
+          </p:cNvPr>
+          <p:cNvSpPr>
+            <a:spLocks noGrp="1"/>
+          </p:cNvSpPr>
+          <p:nvPr>
+            <p:ph type="title"/>
+          </p:nvPr>
+        </p:nvSpPr>
+        <p:spPr>
+          <a:xfrm>
+            <a:off x="199743" y="148699"/>
+            <a:ext cx="10515600" cy="868503"/>
+          </a:xfrm>
+        </p:spPr>
+        <p:txBody>
+          <a:bodyPr/>
+          <a:lstStyle/>
+          <a:p>
+            <a:r>
+              <a:rPr lang="en-US" b="1" dirty="0"/>
+              <a:t>Goodbye and thank the fish!</a:t>
+            </a:r>
+            <a:endParaRPr lang="en-NL" b="1" dirty="0"/>
+          </a:p>
+        </p:txBody>
+      </p:sp>
+      <p:sp>
+        <p:nvSpPr>
+          <p:cNvPr id="3" name="Content Placeholder 2">
+            <a:extLst>
+              <a:ext uri="{FF2B5EF4-FFF2-40B4-BE49-F238E27FC236}">
+                <a16:creationId xmlns:a16="http://schemas.microsoft.com/office/drawing/2014/main" id="{EB447546-94E1-423A-8164-617B557A77FC}"/>
+              </a:ext>
+            </a:extLst>
+          </p:cNvPr>
+          <p:cNvSpPr>
+            <a:spLocks noGrp="1"/>
+          </p:cNvSpPr>
+          <p:nvPr>
+            <p:ph idx="1"/>
+          </p:nvPr>
+        </p:nvSpPr>
+        <p:spPr>
+          <a:xfrm>
+            <a:off x="713755" y="1253331"/>
+            <a:ext cx="10515600" cy="5093362"/>
+          </a:xfrm>
+        </p:spPr>
+        <p:txBody>
+          <a:bodyPr>
+            <a:normAutofit/>
+          </a:bodyPr>
+          <a:lstStyle/>
+          <a:p>
             <a:pPr marL="0" indent="0">
               <a:buNone/>
             </a:pPr>
@@ -12592,20 +12917,6 @@
             </a:r>
             <a:endParaRPr lang="en-GB" dirty="0"/>
           </a:p>
-          <a:p>
-            <a:pPr lvl="1"/>
-            <a:r>
-              <a:rPr lang="en-GB" dirty="0"/>
-              <a:t>In The Netherlands: </a:t>
-            </a:r>
-            <a:r>
-              <a:rPr lang="en-GB" dirty="0">
-                <a:hlinkClick r:id="rId8"/>
-              </a:rPr>
-              <a:t>https://www.bol.com/nl/w/xatapult/1552636/</a:t>
-            </a:r>
-            <a:endParaRPr lang="nl-NL" dirty="0"/>
-          </a:p>
         </p:txBody>
       </p:sp>
       <p:sp>
@@ -12622,13 +12933,13 @@
         </p:nvSpPr>
         <p:spPr>
           <a:xfrm>
-            <a:off x="8343483" y="2110489"/>
-            <a:ext cx="2885872" cy="1318511"/>
+            <a:off x="7548663" y="1780162"/>
+            <a:ext cx="4364477" cy="2289242"/>
           </a:xfrm>
           <a:prstGeom prst="wedgeEllipseCallout">
             <a:avLst>
-              <a:gd name="adj1" fmla="val 62418"/>
-              <a:gd name="adj2" fmla="val 285142"/>
+              <a:gd name="adj1" fmla="val 43251"/>
+              <a:gd name="adj2" fmla="val 159929"/>
             </a:avLst>
           </a:prstGeom>
         </p:spPr>
@@ -12654,44 +12965,44 @@
           <a:p>
             <a:pPr algn="ctr"/>
             <a:r>
-              <a:rPr lang="en-US" dirty="0"/>
+              <a:rPr lang="en-US" sz="2800" dirty="0"/>
               <a:t>See you!</a:t>
             </a:r>
           </a:p>
           <a:p>
             <a:pPr algn="ctr"/>
             <a:r>
-              <a:rPr lang="en-US" dirty="0"/>
+              <a:rPr lang="en-US" sz="2800" dirty="0"/>
               <a:t>And remember, </a:t>
             </a:r>
             <a:r>
-              <a:rPr lang="en-US" dirty="0" err="1"/>
+              <a:rPr lang="en-US" sz="2800" dirty="0" err="1"/>
               <a:t>Kanava</a:t>
             </a:r>
             <a:r>
-              <a:rPr lang="en-US" dirty="0"/>
+              <a:rPr lang="en-US" sz="2800" dirty="0"/>
               <a:t> says: </a:t>
             </a:r>
           </a:p>
           <a:p>
             <a:pPr algn="ctr"/>
             <a:r>
-              <a:rPr lang="en-US" sz="2000" b="1" i="1" dirty="0"/>
+              <a:rPr lang="en-US" sz="3200" b="1" i="1" dirty="0"/>
               <a:t>XProc</a:t>
             </a:r>
             <a:r>
-              <a:rPr lang="en-US" b="1" i="1" dirty="0"/>
+              <a:rPr lang="en-US" sz="2800" b="1" i="1" dirty="0"/>
               <a:t> </a:t>
             </a:r>
             <a:r>
-              <a:rPr lang="en-US" sz="2000" b="1" i="1" dirty="0"/>
+              <a:rPr lang="en-US" sz="3200" b="1" i="1" dirty="0"/>
               <a:t>rocks…</a:t>
             </a:r>
             <a:r>
-              <a:rPr lang="en-US" b="1" i="1" dirty="0"/>
+              <a:rPr lang="en-US" sz="2800" b="1" i="1" dirty="0"/>
               <a:t> </a:t>
             </a:r>
-            <a:endParaRPr lang="en-NL" b="1" i="1" dirty="0"/>
+            <a:endParaRPr lang="en-NL" sz="2800" b="1" i="1" dirty="0"/>
           </a:p>
         </p:txBody>
       </p:sp>
@@ -13994,8 +14305,11 @@
           <a:p>
             <a:r>
               <a:rPr lang="en-US" dirty="0"/>
-              <a:t>Download Morgana by following the download link on </a:t>
-            </a:r>
+              <a:t>Download Morgana by following the download link:</a:t>
+            </a:r>
+            <a:br>
+              <a:rPr lang="en-US" dirty="0"/>
+            </a:br>
             <a:r>
               <a:rPr lang="nl-NL" b="1" dirty="0">
                 <a:hlinkClick r:id="rId3"/>

</xml_diff>

<commit_message>
Presentation update and standard big font in oXygen
</commit_message>
<xml_diff>
--- a/101-A/presentation/markupuk-2020-101-A.pptx
+++ b/101-A/presentation/markupuk-2020-101-A.pptx
@@ -33,7 +33,7 @@
     <p:sldId id="330" r:id="rId21"/>
   </p:sldIdLst>
   <p:sldSz cx="12192000" cy="6858000"/>
-  <p:notesSz cx="6858000" cy="9144000"/>
+  <p:notesSz cx="6797675" cy="9872663"/>
   <p:defaultTextStyle>
     <a:defPPr>
       <a:defRPr lang="en-US"/>
@@ -181,7 +181,7 @@
         <p:spPr>
           <a:xfrm>
             <a:off x="0" y="0"/>
-            <a:ext cx="2971800" cy="458788"/>
+            <a:ext cx="2945659" cy="495348"/>
           </a:xfrm>
           <a:prstGeom prst="rect">
             <a:avLst/>
@@ -217,8 +217,8 @@
         </p:nvSpPr>
         <p:spPr>
           <a:xfrm>
-            <a:off x="3884613" y="0"/>
-            <a:ext cx="2971800" cy="458788"/>
+            <a:off x="3850443" y="0"/>
+            <a:ext cx="2945659" cy="495348"/>
           </a:xfrm>
           <a:prstGeom prst="rect">
             <a:avLst/>
@@ -234,7 +234,7 @@
           <a:p>
             <a:fld id="{0AAE6376-87C4-4D16-82D1-D37904F930BA}" type="datetimeFigureOut">
               <a:rPr lang="en-NL" smtClean="0"/>
-              <a:t>28/05/2020</a:t>
+              <a:t>01/06/2020</a:t>
             </a:fld>
             <a:endParaRPr lang="en-NL"/>
           </a:p>
@@ -258,8 +258,8 @@
         </p:nvSpPr>
         <p:spPr>
           <a:xfrm>
-            <a:off x="0" y="8685213"/>
-            <a:ext cx="2971800" cy="458787"/>
+            <a:off x="0" y="9377317"/>
+            <a:ext cx="2945659" cy="495347"/>
           </a:xfrm>
           <a:prstGeom prst="rect">
             <a:avLst/>
@@ -295,8 +295,8 @@
         </p:nvSpPr>
         <p:spPr>
           <a:xfrm>
-            <a:off x="3884613" y="8685213"/>
-            <a:ext cx="2971800" cy="458787"/>
+            <a:off x="3850443" y="9377317"/>
+            <a:ext cx="2945659" cy="495347"/>
           </a:xfrm>
           <a:prstGeom prst="rect">
             <a:avLst/>
@@ -364,7 +364,7 @@
         <p:spPr>
           <a:xfrm>
             <a:off x="0" y="0"/>
-            <a:ext cx="2971800" cy="458788"/>
+            <a:ext cx="2945659" cy="495348"/>
           </a:xfrm>
           <a:prstGeom prst="rect">
             <a:avLst/>
@@ -394,8 +394,8 @@
         </p:nvSpPr>
         <p:spPr>
           <a:xfrm>
-            <a:off x="3884613" y="0"/>
-            <a:ext cx="2971800" cy="458788"/>
+            <a:off x="3850443" y="0"/>
+            <a:ext cx="2945659" cy="495348"/>
           </a:xfrm>
           <a:prstGeom prst="rect">
             <a:avLst/>
@@ -411,7 +411,7 @@
           <a:p>
             <a:fld id="{3FA52A83-AFF0-44B5-B0CB-BF1EF92BF110}" type="datetimeFigureOut">
               <a:rPr lang="en-NL" smtClean="0"/>
-              <a:t>28/05/2020</a:t>
+              <a:t>01/06/2020</a:t>
             </a:fld>
             <a:endParaRPr lang="en-NL"/>
           </a:p>
@@ -429,8 +429,8 @@
         </p:nvSpPr>
         <p:spPr>
           <a:xfrm>
-            <a:off x="685800" y="1143000"/>
-            <a:ext cx="5486400" cy="3086100"/>
+            <a:off x="438150" y="1233488"/>
+            <a:ext cx="5921375" cy="3332162"/>
           </a:xfrm>
           <a:prstGeom prst="rect">
             <a:avLst/>
@@ -462,8 +462,8 @@
         </p:nvSpPr>
         <p:spPr>
           <a:xfrm>
-            <a:off x="685800" y="4400550"/>
-            <a:ext cx="5486400" cy="3600450"/>
+            <a:off x="679768" y="4751219"/>
+            <a:ext cx="5438140" cy="3887361"/>
           </a:xfrm>
           <a:prstGeom prst="rect">
             <a:avLst/>
@@ -522,8 +522,8 @@
         </p:nvSpPr>
         <p:spPr>
           <a:xfrm>
-            <a:off x="0" y="8685213"/>
-            <a:ext cx="2971800" cy="458787"/>
+            <a:off x="0" y="9377317"/>
+            <a:ext cx="2945659" cy="495347"/>
           </a:xfrm>
           <a:prstGeom prst="rect">
             <a:avLst/>
@@ -553,8 +553,8 @@
         </p:nvSpPr>
         <p:spPr>
           <a:xfrm>
-            <a:off x="3884613" y="8685213"/>
-            <a:ext cx="2971800" cy="458787"/>
+            <a:off x="3850443" y="9377317"/>
+            <a:ext cx="2945659" cy="495347"/>
           </a:xfrm>
           <a:prstGeom prst="rect">
             <a:avLst/>
@@ -1248,7 +1248,7 @@
           <a:p>
             <a:fld id="{9446F294-FC6D-4658-8D72-6C175CC4BEDF}" type="datetimeFigureOut">
               <a:rPr lang="en-US" smtClean="0"/>
-              <a:t>5/28/2020</a:t>
+              <a:t>6/1/2020</a:t>
             </a:fld>
             <a:endParaRPr lang="en-US"/>
           </a:p>
@@ -1448,7 +1448,7 @@
           <a:p>
             <a:fld id="{9446F294-FC6D-4658-8D72-6C175CC4BEDF}" type="datetimeFigureOut">
               <a:rPr lang="en-US" smtClean="0"/>
-              <a:t>5/28/2020</a:t>
+              <a:t>6/1/2020</a:t>
             </a:fld>
             <a:endParaRPr lang="en-US"/>
           </a:p>
@@ -1658,7 +1658,7 @@
           <a:p>
             <a:fld id="{9446F294-FC6D-4658-8D72-6C175CC4BEDF}" type="datetimeFigureOut">
               <a:rPr lang="en-US" smtClean="0"/>
-              <a:t>5/28/2020</a:t>
+              <a:t>6/1/2020</a:t>
             </a:fld>
             <a:endParaRPr lang="en-US"/>
           </a:p>
@@ -1858,7 +1858,7 @@
           <a:p>
             <a:fld id="{9446F294-FC6D-4658-8D72-6C175CC4BEDF}" type="datetimeFigureOut">
               <a:rPr lang="en-US" smtClean="0"/>
-              <a:t>5/28/2020</a:t>
+              <a:t>6/1/2020</a:t>
             </a:fld>
             <a:endParaRPr lang="en-US"/>
           </a:p>
@@ -2134,7 +2134,7 @@
           <a:p>
             <a:fld id="{9446F294-FC6D-4658-8D72-6C175CC4BEDF}" type="datetimeFigureOut">
               <a:rPr lang="en-US" smtClean="0"/>
-              <a:t>5/28/2020</a:t>
+              <a:t>6/1/2020</a:t>
             </a:fld>
             <a:endParaRPr lang="en-US"/>
           </a:p>
@@ -2402,7 +2402,7 @@
           <a:p>
             <a:fld id="{9446F294-FC6D-4658-8D72-6C175CC4BEDF}" type="datetimeFigureOut">
               <a:rPr lang="en-US" smtClean="0"/>
-              <a:t>5/28/2020</a:t>
+              <a:t>6/1/2020</a:t>
             </a:fld>
             <a:endParaRPr lang="en-US"/>
           </a:p>
@@ -2817,7 +2817,7 @@
           <a:p>
             <a:fld id="{9446F294-FC6D-4658-8D72-6C175CC4BEDF}" type="datetimeFigureOut">
               <a:rPr lang="en-US" smtClean="0"/>
-              <a:t>5/28/2020</a:t>
+              <a:t>6/1/2020</a:t>
             </a:fld>
             <a:endParaRPr lang="en-US"/>
           </a:p>
@@ -2959,7 +2959,7 @@
           <a:p>
             <a:fld id="{9446F294-FC6D-4658-8D72-6C175CC4BEDF}" type="datetimeFigureOut">
               <a:rPr lang="en-US" smtClean="0"/>
-              <a:t>5/28/2020</a:t>
+              <a:t>6/1/2020</a:t>
             </a:fld>
             <a:endParaRPr lang="en-US"/>
           </a:p>
@@ -3072,7 +3072,7 @@
           <a:p>
             <a:fld id="{9446F294-FC6D-4658-8D72-6C175CC4BEDF}" type="datetimeFigureOut">
               <a:rPr lang="en-US" smtClean="0"/>
-              <a:t>5/28/2020</a:t>
+              <a:t>6/1/2020</a:t>
             </a:fld>
             <a:endParaRPr lang="en-US"/>
           </a:p>
@@ -3385,7 +3385,7 @@
           <a:p>
             <a:fld id="{9446F294-FC6D-4658-8D72-6C175CC4BEDF}" type="datetimeFigureOut">
               <a:rPr lang="en-US" smtClean="0"/>
-              <a:t>5/28/2020</a:t>
+              <a:t>6/1/2020</a:t>
             </a:fld>
             <a:endParaRPr lang="en-US"/>
           </a:p>
@@ -3674,7 +3674,7 @@
           <a:p>
             <a:fld id="{9446F294-FC6D-4658-8D72-6C175CC4BEDF}" type="datetimeFigureOut">
               <a:rPr lang="en-US" smtClean="0"/>
-              <a:t>5/28/2020</a:t>
+              <a:t>6/1/2020</a:t>
             </a:fld>
             <a:endParaRPr lang="en-US"/>
           </a:p>
@@ -3917,7 +3917,7 @@
           <a:p>
             <a:fld id="{9446F294-FC6D-4658-8D72-6C175CC4BEDF}" type="datetimeFigureOut">
               <a:rPr lang="en-US" smtClean="0"/>
-              <a:t>5/28/2020</a:t>
+              <a:t>6/1/2020</a:t>
             </a:fld>
             <a:endParaRPr lang="en-US"/>
           </a:p>
@@ -15404,7 +15404,7 @@
         </p:spPr>
         <p:txBody>
           <a:bodyPr>
-            <a:normAutofit fontScale="92500" lnSpcReduction="10000"/>
+            <a:normAutofit fontScale="92500" lnSpcReduction="20000"/>
           </a:bodyPr>
           <a:lstStyle/>
           <a:p>
@@ -15427,6 +15427,23 @@
             <a:r>
               <a:rPr lang="en-US" dirty="0"/>
               <a:t>Unzip the zip</a:t>
+            </a:r>
+          </a:p>
+          <a:p>
+            <a:r>
+              <a:rPr lang="en-US" dirty="0"/>
+              <a:t>Add one of the Saxon jars to the </a:t>
+            </a:r>
+            <a:r>
+              <a:rPr lang="en-US" sz="2400" b="1" dirty="0" err="1">
+                <a:latin typeface="Courier New" panose="02070309020205020404" pitchFamily="49" charset="0"/>
+                <a:cs typeface="Courier New" panose="02070309020205020404" pitchFamily="49" charset="0"/>
+              </a:rPr>
+              <a:t>MorganaXProc-IIIse_lib</a:t>
+            </a:r>
+            <a:r>
+              <a:rPr lang="en-US" dirty="0"/>
+              <a:t> sub-directory</a:t>
             </a:r>
           </a:p>
           <a:p>

</xml_diff>

<commit_message>
One more presentation update for part 1
</commit_message>
<xml_diff>
--- a/101-A/presentation/markupuk-2020-101-A.pptx
+++ b/101-A/presentation/markupuk-2020-101-A.pptx
@@ -13651,7 +13651,32 @@
           <a:p>
             <a:r>
               <a:rPr lang="en-US" dirty="0"/>
-              <a:t>You can connect a port to:</a:t>
+              <a:t>You can connect a port using </a:t>
+            </a:r>
+            <a:r>
+              <a:rPr lang="en-US" sz="2400" dirty="0">
+                <a:latin typeface="Courier New" panose="02070309020205020404" pitchFamily="49" charset="0"/>
+                <a:cs typeface="Courier New" panose="02070309020205020404" pitchFamily="49" charset="0"/>
+              </a:rPr>
+              <a:t>&lt;</a:t>
+            </a:r>
+            <a:r>
+              <a:rPr lang="en-US" sz="2400" dirty="0" err="1">
+                <a:latin typeface="Courier New" panose="02070309020205020404" pitchFamily="49" charset="0"/>
+                <a:cs typeface="Courier New" panose="02070309020205020404" pitchFamily="49" charset="0"/>
+              </a:rPr>
+              <a:t>p:with-input</a:t>
+            </a:r>
+            <a:r>
+              <a:rPr lang="en-US" sz="2400" dirty="0">
+                <a:latin typeface="Courier New" panose="02070309020205020404" pitchFamily="49" charset="0"/>
+                <a:cs typeface="Courier New" panose="02070309020205020404" pitchFamily="49" charset="0"/>
+              </a:rPr>
+              <a:t> port="…"&gt;</a:t>
+            </a:r>
+            <a:r>
+              <a:rPr lang="en-US" dirty="0"/>
+              <a:t> to:</a:t>
             </a:r>
           </a:p>
           <a:p>

</xml_diff>